<commit_message>
Link al Video y Version Final de la Presentación
</commit_message>
<xml_diff>
--- a/Lab4/Presentación Laboratorio 4.pptx
+++ b/Lab4/Presentación Laboratorio 4.pptx
@@ -21,15 +21,16 @@
     <p:sldId id="266" r:id="rId16"/>
     <p:sldId id="267" r:id="rId17"/>
     <p:sldId id="268" r:id="rId18"/>
+    <p:sldId id="269" r:id="rId19"/>
   </p:sldIdLst>
   <p:sldSz cy="5143500" cx="9144000"/>
   <p:notesSz cx="6858000" cy="9144000"/>
   <p:embeddedFontLst>
     <p:embeddedFont>
       <p:font typeface="Old Standard TT"/>
-      <p:regular r:id="rId19"/>
-      <p:bold r:id="rId20"/>
-      <p:italic r:id="rId21"/>
+      <p:regular r:id="rId20"/>
+      <p:bold r:id="rId21"/>
+      <p:italic r:id="rId22"/>
     </p:embeddedFont>
   </p:embeddedFontLst>
   <p:defaultTextStyle>
@@ -963,7 +964,7 @@
   <p:cSld>
     <p:spTree>
       <p:nvGrpSpPr>
-        <p:cNvPr id="117" name="Shape 117"/>
+        <p:cNvPr id="111" name="Shape 111"/>
         <p:cNvGrpSpPr/>
         <p:nvPr/>
       </p:nvGrpSpPr>
@@ -977,7 +978,7 @@
       </p:grpSpPr>
       <p:sp>
         <p:nvSpPr>
-          <p:cNvPr id="118" name="Google Shape;118;g36241770bfc_1_5:notes"/>
+          <p:cNvPr id="112" name="Google Shape;112;g3671d62583b_0_27:notes"/>
           <p:cNvSpPr/>
           <p:nvPr>
             <p:ph idx="2" type="sldImg"/>
@@ -1012,7 +1013,7 @@
       </p:sp>
       <p:sp>
         <p:nvSpPr>
-          <p:cNvPr id="119" name="Google Shape;119;g36241770bfc_1_5:notes"/>
+          <p:cNvPr id="113" name="Google Shape;113;g3671d62583b_0_27:notes"/>
           <p:cNvSpPr txBox="1"/>
           <p:nvPr>
             <p:ph idx="1" type="body"/>
@@ -1062,7 +1063,7 @@
   <p:cSld>
     <p:spTree>
       <p:nvGrpSpPr>
-        <p:cNvPr id="124" name="Shape 124"/>
+        <p:cNvPr id="121" name="Shape 121"/>
         <p:cNvGrpSpPr/>
         <p:nvPr/>
       </p:nvGrpSpPr>
@@ -1076,7 +1077,7 @@
       </p:grpSpPr>
       <p:sp>
         <p:nvSpPr>
-          <p:cNvPr id="125" name="Google Shape;125;g36242052545_1_15:notes"/>
+          <p:cNvPr id="122" name="Google Shape;122;g36241770bfc_1_5:notes"/>
           <p:cNvSpPr/>
           <p:nvPr>
             <p:ph idx="2" type="sldImg"/>
@@ -1111,7 +1112,7 @@
       </p:sp>
       <p:sp>
         <p:nvSpPr>
-          <p:cNvPr id="126" name="Google Shape;126;g36242052545_1_15:notes"/>
+          <p:cNvPr id="123" name="Google Shape;123;g36241770bfc_1_5:notes"/>
           <p:cNvSpPr txBox="1"/>
           <p:nvPr>
             <p:ph idx="1" type="body"/>
@@ -1161,7 +1162,7 @@
   <p:cSld>
     <p:spTree>
       <p:nvGrpSpPr>
-        <p:cNvPr id="129" name="Shape 129"/>
+        <p:cNvPr id="128" name="Shape 128"/>
         <p:cNvGrpSpPr/>
         <p:nvPr/>
       </p:nvGrpSpPr>
@@ -1175,7 +1176,7 @@
       </p:grpSpPr>
       <p:sp>
         <p:nvSpPr>
-          <p:cNvPr id="130" name="Google Shape;130;g36242052545_1_2:notes"/>
+          <p:cNvPr id="129" name="Google Shape;129;g36242052545_1_15:notes"/>
           <p:cNvSpPr/>
           <p:nvPr>
             <p:ph idx="2" type="sldImg"/>
@@ -1210,7 +1211,7 @@
       </p:sp>
       <p:sp>
         <p:nvSpPr>
-          <p:cNvPr id="131" name="Google Shape;131;g36242052545_1_2:notes"/>
+          <p:cNvPr id="130" name="Google Shape;130;g36242052545_1_15:notes"/>
           <p:cNvSpPr txBox="1"/>
           <p:nvPr>
             <p:ph idx="1" type="body"/>
@@ -1260,7 +1261,7 @@
   <p:cSld>
     <p:spTree>
       <p:nvGrpSpPr>
-        <p:cNvPr id="136" name="Shape 136"/>
+        <p:cNvPr id="133" name="Shape 133"/>
         <p:cNvGrpSpPr/>
         <p:nvPr/>
       </p:nvGrpSpPr>
@@ -1274,7 +1275,7 @@
       </p:grpSpPr>
       <p:sp>
         <p:nvSpPr>
-          <p:cNvPr id="137" name="Google Shape;137;g36242052545_1_9:notes"/>
+          <p:cNvPr id="134" name="Google Shape;134;g36242052545_1_2:notes"/>
           <p:cNvSpPr/>
           <p:nvPr>
             <p:ph idx="2" type="sldImg"/>
@@ -1309,7 +1310,106 @@
       </p:sp>
       <p:sp>
         <p:nvSpPr>
-          <p:cNvPr id="138" name="Google Shape;138;g36242052545_1_9:notes"/>
+          <p:cNvPr id="135" name="Google Shape;135;g36242052545_1_2:notes"/>
+          <p:cNvSpPr txBox="1"/>
+          <p:nvPr>
+            <p:ph idx="1" type="body"/>
+          </p:nvPr>
+        </p:nvSpPr>
+        <p:spPr>
+          <a:xfrm>
+            <a:off x="685800" y="4343400"/>
+            <a:ext cx="5486400" cy="4114800"/>
+          </a:xfrm>
+          <a:prstGeom prst="rect">
+            <a:avLst/>
+          </a:prstGeom>
+        </p:spPr>
+        <p:txBody>
+          <a:bodyPr anchorCtr="0" anchor="t" bIns="91425" lIns="91425" spcFirstLastPara="1" rIns="91425" wrap="square" tIns="91425">
+            <a:noAutofit/>
+          </a:bodyPr>
+          <a:lstStyle/>
+          <a:p>
+            <a:pPr indent="0" lvl="0" marL="0" rtl="0" algn="l">
+              <a:spcBef>
+                <a:spcPts val="0"/>
+              </a:spcBef>
+              <a:spcAft>
+                <a:spcPts val="0"/>
+              </a:spcAft>
+              <a:buNone/>
+            </a:pPr>
+            <a:r>
+              <a:t/>
+            </a:r>
+            <a:endParaRPr/>
+          </a:p>
+        </p:txBody>
+      </p:sp>
+    </p:spTree>
+  </p:cSld>
+  <p:clrMapOvr>
+    <a:masterClrMapping/>
+  </p:clrMapOvr>
+</p:notes>
+</file>
+
+<file path=ppt/notesSlides/notesSlide14.xml><?xml version="1.0" encoding="utf-8"?>
+<p:notes xmlns:a="http://schemas.openxmlformats.org/drawingml/2006/main" xmlns:r="http://schemas.openxmlformats.org/officeDocument/2006/relationships" xmlns:mc="http://schemas.openxmlformats.org/markup-compatibility/2006" xmlns:mv="urn:schemas-microsoft-com:mac:vml" xmlns:p="http://schemas.openxmlformats.org/presentationml/2006/main" xmlns:c="http://schemas.openxmlformats.org/drawingml/2006/chart" xmlns:dgm="http://schemas.openxmlformats.org/drawingml/2006/diagram" xmlns:o="urn:schemas-microsoft-com:office:office" xmlns:v="urn:schemas-microsoft-com:vml" xmlns:pvml="urn:schemas-microsoft-com:office:powerpoint" xmlns:com="http://schemas.openxmlformats.org/drawingml/2006/compatibility" xmlns:p14="http://schemas.microsoft.com/office/powerpoint/2010/main" xmlns:p15="http://schemas.microsoft.com/office/powerpoint/2012/main" xmlns:ahyp="http://schemas.microsoft.com/office/drawing/2018/hyperlinkcolor" showMasterPhAnim="0" showMasterSp="0">
+  <p:cSld>
+    <p:spTree>
+      <p:nvGrpSpPr>
+        <p:cNvPr id="140" name="Shape 140"/>
+        <p:cNvGrpSpPr/>
+        <p:nvPr/>
+      </p:nvGrpSpPr>
+      <p:grpSpPr>
+        <a:xfrm>
+          <a:off x="0" y="0"/>
+          <a:ext cx="0" cy="0"/>
+          <a:chOff x="0" y="0"/>
+          <a:chExt cx="0" cy="0"/>
+        </a:xfrm>
+      </p:grpSpPr>
+      <p:sp>
+        <p:nvSpPr>
+          <p:cNvPr id="141" name="Google Shape;141;g36242052545_1_9:notes"/>
+          <p:cNvSpPr/>
+          <p:nvPr>
+            <p:ph idx="2" type="sldImg"/>
+          </p:nvPr>
+        </p:nvSpPr>
+        <p:spPr>
+          <a:xfrm>
+            <a:off x="381300" y="685800"/>
+            <a:ext cx="6096000" cy="3429000"/>
+          </a:xfrm>
+          <a:custGeom>
+            <a:rect b="b" l="l" r="r" t="t"/>
+            <a:pathLst>
+              <a:path extrusionOk="0" h="120000" w="120000">
+                <a:moveTo>
+                  <a:pt x="0" y="0"/>
+                </a:moveTo>
+                <a:lnTo>
+                  <a:pt x="120000" y="0"/>
+                </a:lnTo>
+                <a:lnTo>
+                  <a:pt x="120000" y="120000"/>
+                </a:lnTo>
+                <a:lnTo>
+                  <a:pt x="0" y="120000"/>
+                </a:lnTo>
+                <a:close/>
+              </a:path>
+            </a:pathLst>
+          </a:custGeom>
+        </p:spPr>
+      </p:sp>
+      <p:sp>
+        <p:nvSpPr>
+          <p:cNvPr id="142" name="Google Shape;142;g36242052545_1_9:notes"/>
           <p:cNvSpPr txBox="1"/>
           <p:nvPr>
             <p:ph idx="1" type="body"/>
@@ -1769,7 +1869,106 @@
       </p:grpSpPr>
       <p:sp>
         <p:nvSpPr>
-          <p:cNvPr id="88" name="Google Shape;88;p2:notes"/>
+          <p:cNvPr id="88" name="Google Shape;88;g36249a9413e_1_0:notes"/>
+          <p:cNvSpPr txBox="1"/>
+          <p:nvPr>
+            <p:ph idx="1" type="body"/>
+          </p:nvPr>
+        </p:nvSpPr>
+        <p:spPr>
+          <a:xfrm>
+            <a:off x="685800" y="4343400"/>
+            <a:ext cx="5486400" cy="4114800"/>
+          </a:xfrm>
+          <a:prstGeom prst="rect">
+            <a:avLst/>
+          </a:prstGeom>
+        </p:spPr>
+        <p:txBody>
+          <a:bodyPr anchorCtr="0" anchor="t" bIns="91425" lIns="91425" spcFirstLastPara="1" rIns="91425" wrap="square" tIns="91425">
+            <a:noAutofit/>
+          </a:bodyPr>
+          <a:lstStyle/>
+          <a:p>
+            <a:pPr indent="0" lvl="0" marL="0" rtl="0" algn="l">
+              <a:spcBef>
+                <a:spcPts val="0"/>
+              </a:spcBef>
+              <a:spcAft>
+                <a:spcPts val="0"/>
+              </a:spcAft>
+              <a:buNone/>
+            </a:pPr>
+            <a:r>
+              <a:t/>
+            </a:r>
+            <a:endParaRPr/>
+          </a:p>
+        </p:txBody>
+      </p:sp>
+      <p:sp>
+        <p:nvSpPr>
+          <p:cNvPr id="89" name="Google Shape;89;g36249a9413e_1_0:notes"/>
+          <p:cNvSpPr/>
+          <p:nvPr>
+            <p:ph idx="2" type="sldImg"/>
+          </p:nvPr>
+        </p:nvSpPr>
+        <p:spPr>
+          <a:xfrm>
+            <a:off x="1143225" y="685800"/>
+            <a:ext cx="4572300" cy="3429000"/>
+          </a:xfrm>
+          <a:custGeom>
+            <a:rect b="b" l="l" r="r" t="t"/>
+            <a:pathLst>
+              <a:path extrusionOk="0" h="120000" w="120000">
+                <a:moveTo>
+                  <a:pt x="0" y="0"/>
+                </a:moveTo>
+                <a:lnTo>
+                  <a:pt x="120000" y="0"/>
+                </a:lnTo>
+                <a:lnTo>
+                  <a:pt x="120000" y="120000"/>
+                </a:lnTo>
+                <a:lnTo>
+                  <a:pt x="0" y="120000"/>
+                </a:lnTo>
+                <a:close/>
+              </a:path>
+            </a:pathLst>
+          </a:custGeom>
+        </p:spPr>
+      </p:sp>
+    </p:spTree>
+  </p:cSld>
+  <p:clrMapOvr>
+    <a:masterClrMapping/>
+  </p:clrMapOvr>
+</p:notes>
+</file>
+
+<file path=ppt/notesSlides/notesSlide7.xml><?xml version="1.0" encoding="utf-8"?>
+<p:notes xmlns:a="http://schemas.openxmlformats.org/drawingml/2006/main" xmlns:r="http://schemas.openxmlformats.org/officeDocument/2006/relationships" xmlns:mc="http://schemas.openxmlformats.org/markup-compatibility/2006" xmlns:mv="urn:schemas-microsoft-com:mac:vml" xmlns:p="http://schemas.openxmlformats.org/presentationml/2006/main" xmlns:c="http://schemas.openxmlformats.org/drawingml/2006/chart" xmlns:dgm="http://schemas.openxmlformats.org/drawingml/2006/diagram" xmlns:o="urn:schemas-microsoft-com:office:office" xmlns:v="urn:schemas-microsoft-com:vml" xmlns:pvml="urn:schemas-microsoft-com:office:powerpoint" xmlns:com="http://schemas.openxmlformats.org/drawingml/2006/compatibility" xmlns:p14="http://schemas.microsoft.com/office/powerpoint/2010/main" xmlns:p15="http://schemas.microsoft.com/office/powerpoint/2012/main" xmlns:ahyp="http://schemas.microsoft.com/office/drawing/2018/hyperlinkcolor" showMasterPhAnim="0" showMasterSp="0">
+  <p:cSld>
+    <p:spTree>
+      <p:nvGrpSpPr>
+        <p:cNvPr id="93" name="Shape 93"/>
+        <p:cNvGrpSpPr/>
+        <p:nvPr/>
+      </p:nvGrpSpPr>
+      <p:grpSpPr>
+        <a:xfrm>
+          <a:off x="0" y="0"/>
+          <a:ext cx="0" cy="0"/>
+          <a:chOff x="0" y="0"/>
+          <a:chExt cx="0" cy="0"/>
+        </a:xfrm>
+      </p:grpSpPr>
+      <p:sp>
+        <p:nvSpPr>
+          <p:cNvPr id="94" name="Google Shape;94;p4:notes"/>
           <p:cNvSpPr/>
           <p:nvPr>
             <p:ph idx="2" type="sldImg"/>
@@ -1814,7 +2013,7 @@
       </p:sp>
       <p:sp>
         <p:nvSpPr>
-          <p:cNvPr id="89" name="Google Shape;89;p2:notes"/>
+          <p:cNvPr id="95" name="Google Shape;95;p4:notes"/>
           <p:cNvSpPr txBox="1"/>
           <p:nvPr>
             <p:ph idx="1" type="body"/>
@@ -1867,12 +2066,12 @@
 </p:notes>
 </file>
 
-<file path=ppt/notesSlides/notesSlide7.xml><?xml version="1.0" encoding="utf-8"?>
+<file path=ppt/notesSlides/notesSlide8.xml><?xml version="1.0" encoding="utf-8"?>
 <p:notes xmlns:a="http://schemas.openxmlformats.org/drawingml/2006/main" xmlns:r="http://schemas.openxmlformats.org/officeDocument/2006/relationships" xmlns:mc="http://schemas.openxmlformats.org/markup-compatibility/2006" xmlns:mv="urn:schemas-microsoft-com:mac:vml" xmlns:p="http://schemas.openxmlformats.org/presentationml/2006/main" xmlns:c="http://schemas.openxmlformats.org/drawingml/2006/chart" xmlns:dgm="http://schemas.openxmlformats.org/drawingml/2006/diagram" xmlns:o="urn:schemas-microsoft-com:office:office" xmlns:v="urn:schemas-microsoft-com:vml" xmlns:pvml="urn:schemas-microsoft-com:office:powerpoint" xmlns:com="http://schemas.openxmlformats.org/drawingml/2006/compatibility" xmlns:p14="http://schemas.microsoft.com/office/powerpoint/2010/main" xmlns:p15="http://schemas.microsoft.com/office/powerpoint/2012/main" xmlns:ahyp="http://schemas.microsoft.com/office/drawing/2018/hyperlinkcolor" showMasterPhAnim="0" showMasterSp="0">
   <p:cSld>
     <p:spTree>
       <p:nvGrpSpPr>
-        <p:cNvPr id="94" name="Shape 94"/>
+        <p:cNvPr id="99" name="Shape 99"/>
         <p:cNvGrpSpPr/>
         <p:nvPr/>
       </p:nvGrpSpPr>
@@ -1886,7 +2085,46 @@
       </p:grpSpPr>
       <p:sp>
         <p:nvSpPr>
-          <p:cNvPr id="95" name="Google Shape;95;p3:notes"/>
+          <p:cNvPr id="100" name="Google Shape;100;g36249a9413e_1_12:notes"/>
+          <p:cNvSpPr txBox="1"/>
+          <p:nvPr>
+            <p:ph idx="1" type="body"/>
+          </p:nvPr>
+        </p:nvSpPr>
+        <p:spPr>
+          <a:xfrm>
+            <a:off x="685800" y="4343400"/>
+            <a:ext cx="5486400" cy="4114800"/>
+          </a:xfrm>
+          <a:prstGeom prst="rect">
+            <a:avLst/>
+          </a:prstGeom>
+        </p:spPr>
+        <p:txBody>
+          <a:bodyPr anchorCtr="0" anchor="t" bIns="91425" lIns="91425" spcFirstLastPara="1" rIns="91425" wrap="square" tIns="91425">
+            <a:noAutofit/>
+          </a:bodyPr>
+          <a:lstStyle/>
+          <a:p>
+            <a:pPr indent="0" lvl="0" marL="0" rtl="0" algn="l">
+              <a:spcBef>
+                <a:spcPts val="0"/>
+              </a:spcBef>
+              <a:spcAft>
+                <a:spcPts val="0"/>
+              </a:spcAft>
+              <a:buNone/>
+            </a:pPr>
+            <a:r>
+              <a:t/>
+            </a:r>
+            <a:endParaRPr/>
+          </a:p>
+        </p:txBody>
+      </p:sp>
+      <p:sp>
+        <p:nvSpPr>
+          <p:cNvPr id="101" name="Google Shape;101;g36249a9413e_1_12:notes"/>
           <p:cNvSpPr/>
           <p:nvPr>
             <p:ph idx="2" type="sldImg"/>
@@ -1894,8 +2132,8 @@
         </p:nvSpPr>
         <p:spPr>
           <a:xfrm>
-            <a:off x="381300" y="685800"/>
-            <a:ext cx="6096000" cy="3429000"/>
+            <a:off x="1143225" y="685800"/>
+            <a:ext cx="4572300" cy="3429000"/>
           </a:xfrm>
           <a:custGeom>
             <a:rect b="b" l="l" r="r" t="t"/>
@@ -1917,181 +2155,7 @@
               </a:path>
             </a:pathLst>
           </a:custGeom>
-          <a:noFill/>
-          <a:ln cap="flat" cmpd="sng" w="9525">
-            <a:solidFill>
-              <a:srgbClr val="000000"/>
-            </a:solidFill>
-            <a:prstDash val="solid"/>
-            <a:round/>
-            <a:headEnd len="sm" w="sm" type="none"/>
-            <a:tailEnd len="sm" w="sm" type="none"/>
-          </a:ln>
         </p:spPr>
-      </p:sp>
-      <p:sp>
-        <p:nvSpPr>
-          <p:cNvPr id="96" name="Google Shape;96;p3:notes"/>
-          <p:cNvSpPr txBox="1"/>
-          <p:nvPr>
-            <p:ph idx="1" type="body"/>
-          </p:nvPr>
-        </p:nvSpPr>
-        <p:spPr>
-          <a:xfrm>
-            <a:off x="685800" y="4343400"/>
-            <a:ext cx="5486400" cy="4114800"/>
-          </a:xfrm>
-          <a:prstGeom prst="rect">
-            <a:avLst/>
-          </a:prstGeom>
-          <a:noFill/>
-          <a:ln>
-            <a:noFill/>
-          </a:ln>
-        </p:spPr>
-        <p:txBody>
-          <a:bodyPr anchorCtr="0" anchor="t" bIns="91425" lIns="91425" spcFirstLastPara="1" rIns="91425" wrap="square" tIns="91425">
-            <a:noAutofit/>
-          </a:bodyPr>
-          <a:lstStyle/>
-          <a:p>
-            <a:pPr indent="0" lvl="0" marL="0" rtl="0" algn="l">
-              <a:lnSpc>
-                <a:spcPct val="100000"/>
-              </a:lnSpc>
-              <a:spcBef>
-                <a:spcPts val="0"/>
-              </a:spcBef>
-              <a:spcAft>
-                <a:spcPts val="0"/>
-              </a:spcAft>
-              <a:buSzPts val="1400"/>
-              <a:buNone/>
-            </a:pPr>
-            <a:r>
-              <a:t/>
-            </a:r>
-            <a:endParaRPr/>
-          </a:p>
-        </p:txBody>
-      </p:sp>
-    </p:spTree>
-  </p:cSld>
-  <p:clrMapOvr>
-    <a:masterClrMapping/>
-  </p:clrMapOvr>
-</p:notes>
-</file>
-
-<file path=ppt/notesSlides/notesSlide8.xml><?xml version="1.0" encoding="utf-8"?>
-<p:notes xmlns:a="http://schemas.openxmlformats.org/drawingml/2006/main" xmlns:r="http://schemas.openxmlformats.org/officeDocument/2006/relationships" xmlns:mc="http://schemas.openxmlformats.org/markup-compatibility/2006" xmlns:mv="urn:schemas-microsoft-com:mac:vml" xmlns:p="http://schemas.openxmlformats.org/presentationml/2006/main" xmlns:c="http://schemas.openxmlformats.org/drawingml/2006/chart" xmlns:dgm="http://schemas.openxmlformats.org/drawingml/2006/diagram" xmlns:o="urn:schemas-microsoft-com:office:office" xmlns:v="urn:schemas-microsoft-com:vml" xmlns:pvml="urn:schemas-microsoft-com:office:powerpoint" xmlns:com="http://schemas.openxmlformats.org/drawingml/2006/compatibility" xmlns:p14="http://schemas.microsoft.com/office/powerpoint/2010/main" xmlns:p15="http://schemas.microsoft.com/office/powerpoint/2012/main" xmlns:ahyp="http://schemas.microsoft.com/office/drawing/2018/hyperlinkcolor" showMasterPhAnim="0" showMasterSp="0">
-  <p:cSld>
-    <p:spTree>
-      <p:nvGrpSpPr>
-        <p:cNvPr id="101" name="Shape 101"/>
-        <p:cNvGrpSpPr/>
-        <p:nvPr/>
-      </p:nvGrpSpPr>
-      <p:grpSpPr>
-        <a:xfrm>
-          <a:off x="0" y="0"/>
-          <a:ext cx="0" cy="0"/>
-          <a:chOff x="0" y="0"/>
-          <a:chExt cx="0" cy="0"/>
-        </a:xfrm>
-      </p:grpSpPr>
-      <p:sp>
-        <p:nvSpPr>
-          <p:cNvPr id="102" name="Google Shape;102;p4:notes"/>
-          <p:cNvSpPr/>
-          <p:nvPr>
-            <p:ph idx="2" type="sldImg"/>
-          </p:nvPr>
-        </p:nvSpPr>
-        <p:spPr>
-          <a:xfrm>
-            <a:off x="381300" y="685800"/>
-            <a:ext cx="6096000" cy="3429000"/>
-          </a:xfrm>
-          <a:custGeom>
-            <a:rect b="b" l="l" r="r" t="t"/>
-            <a:pathLst>
-              <a:path extrusionOk="0" h="120000" w="120000">
-                <a:moveTo>
-                  <a:pt x="0" y="0"/>
-                </a:moveTo>
-                <a:lnTo>
-                  <a:pt x="120000" y="0"/>
-                </a:lnTo>
-                <a:lnTo>
-                  <a:pt x="120000" y="120000"/>
-                </a:lnTo>
-                <a:lnTo>
-                  <a:pt x="0" y="120000"/>
-                </a:lnTo>
-                <a:close/>
-              </a:path>
-            </a:pathLst>
-          </a:custGeom>
-          <a:noFill/>
-          <a:ln cap="flat" cmpd="sng" w="9525">
-            <a:solidFill>
-              <a:srgbClr val="000000"/>
-            </a:solidFill>
-            <a:prstDash val="solid"/>
-            <a:round/>
-            <a:headEnd len="sm" w="sm" type="none"/>
-            <a:tailEnd len="sm" w="sm" type="none"/>
-          </a:ln>
-        </p:spPr>
-      </p:sp>
-      <p:sp>
-        <p:nvSpPr>
-          <p:cNvPr id="103" name="Google Shape;103;p4:notes"/>
-          <p:cNvSpPr txBox="1"/>
-          <p:nvPr>
-            <p:ph idx="1" type="body"/>
-          </p:nvPr>
-        </p:nvSpPr>
-        <p:spPr>
-          <a:xfrm>
-            <a:off x="685800" y="4343400"/>
-            <a:ext cx="5486400" cy="4114800"/>
-          </a:xfrm>
-          <a:prstGeom prst="rect">
-            <a:avLst/>
-          </a:prstGeom>
-          <a:noFill/>
-          <a:ln>
-            <a:noFill/>
-          </a:ln>
-        </p:spPr>
-        <p:txBody>
-          <a:bodyPr anchorCtr="0" anchor="t" bIns="91425" lIns="91425" spcFirstLastPara="1" rIns="91425" wrap="square" tIns="91425">
-            <a:noAutofit/>
-          </a:bodyPr>
-          <a:lstStyle/>
-          <a:p>
-            <a:pPr indent="0" lvl="0" marL="0" rtl="0" algn="l">
-              <a:lnSpc>
-                <a:spcPct val="100000"/>
-              </a:lnSpc>
-              <a:spcBef>
-                <a:spcPts val="0"/>
-              </a:spcBef>
-              <a:spcAft>
-                <a:spcPts val="0"/>
-              </a:spcAft>
-              <a:buSzPts val="1400"/>
-              <a:buNone/>
-            </a:pPr>
-            <a:r>
-              <a:t/>
-            </a:r>
-            <a:endParaRPr/>
-          </a:p>
-        </p:txBody>
       </p:sp>
     </p:spTree>
   </p:cSld>
@@ -2106,7 +2170,7 @@
   <p:cSld>
     <p:spTree>
       <p:nvGrpSpPr>
-        <p:cNvPr id="107" name="Shape 107"/>
+        <p:cNvPr id="105" name="Shape 105"/>
         <p:cNvGrpSpPr/>
         <p:nvPr/>
       </p:nvGrpSpPr>
@@ -2120,7 +2184,7 @@
       </p:grpSpPr>
       <p:sp>
         <p:nvSpPr>
-          <p:cNvPr id="108" name="Google Shape;108;g3671d62583b_0_27:notes"/>
+          <p:cNvPr id="106" name="Google Shape;106;g36249a9413e_1_25:notes"/>
           <p:cNvSpPr/>
           <p:nvPr>
             <p:ph idx="2" type="sldImg"/>
@@ -2155,7 +2219,7 @@
       </p:sp>
       <p:sp>
         <p:nvSpPr>
-          <p:cNvPr id="109" name="Google Shape;109;g3671d62583b_0_27:notes"/>
+          <p:cNvPr id="107" name="Google Shape;107;g36249a9413e_1_25:notes"/>
           <p:cNvSpPr txBox="1"/>
           <p:nvPr>
             <p:ph idx="1" type="body"/>
@@ -10604,7 +10668,7 @@
   <p:cSld>
     <p:spTree>
       <p:nvGrpSpPr>
-        <p:cNvPr id="120" name="Shape 120"/>
+        <p:cNvPr id="114" name="Shape 114"/>
         <p:cNvGrpSpPr/>
         <p:nvPr/>
       </p:nvGrpSpPr>
@@ -10618,7 +10682,537 @@
       </p:grpSpPr>
       <p:sp>
         <p:nvSpPr>
-          <p:cNvPr id="121" name="Google Shape;121;p22"/>
+          <p:cNvPr id="115" name="Google Shape;115;p22"/>
+          <p:cNvSpPr/>
+          <p:nvPr/>
+        </p:nvSpPr>
+        <p:spPr>
+          <a:xfrm>
+            <a:off x="204225" y="1370650"/>
+            <a:ext cx="1676700" cy="3517200"/>
+          </a:xfrm>
+          <a:prstGeom prst="rect">
+            <a:avLst/>
+          </a:prstGeom>
+          <a:solidFill>
+            <a:schemeClr val="dk1"/>
+          </a:solidFill>
+          <a:ln cap="flat" cmpd="sng" w="9525">
+            <a:solidFill>
+              <a:schemeClr val="dk1"/>
+            </a:solidFill>
+            <a:prstDash val="solid"/>
+            <a:round/>
+            <a:headEnd len="sm" w="sm" type="none"/>
+            <a:tailEnd len="sm" w="sm" type="none"/>
+          </a:ln>
+        </p:spPr>
+        <p:txBody>
+          <a:bodyPr anchorCtr="0" anchor="ctr" bIns="91425" lIns="91425" spcFirstLastPara="1" rIns="91425" wrap="square" tIns="91425">
+            <a:noAutofit/>
+          </a:bodyPr>
+          <a:lstStyle/>
+          <a:p>
+            <a:pPr indent="0" lvl="0" marL="0" rtl="0" algn="ctr">
+              <a:spcBef>
+                <a:spcPts val="0"/>
+              </a:spcBef>
+              <a:spcAft>
+                <a:spcPts val="0"/>
+              </a:spcAft>
+              <a:buNone/>
+            </a:pPr>
+            <a:r>
+              <a:t/>
+            </a:r>
+            <a:endParaRPr>
+              <a:latin typeface="Old Standard TT"/>
+              <a:ea typeface="Old Standard TT"/>
+              <a:cs typeface="Old Standard TT"/>
+              <a:sym typeface="Old Standard TT"/>
+            </a:endParaRPr>
+          </a:p>
+        </p:txBody>
+      </p:sp>
+      <p:sp>
+        <p:nvSpPr>
+          <p:cNvPr id="116" name="Google Shape;116;p22"/>
+          <p:cNvSpPr txBox="1"/>
+          <p:nvPr>
+            <p:ph type="title"/>
+          </p:nvPr>
+        </p:nvSpPr>
+        <p:spPr>
+          <a:xfrm>
+            <a:off x="512700" y="231975"/>
+            <a:ext cx="8118600" cy="965400"/>
+          </a:xfrm>
+          <a:prstGeom prst="rect">
+            <a:avLst/>
+          </a:prstGeom>
+        </p:spPr>
+        <p:txBody>
+          <a:bodyPr anchorCtr="0" anchor="b" bIns="91425" lIns="91425" spcFirstLastPara="1" rIns="91425" wrap="square" tIns="91425">
+            <a:noAutofit/>
+          </a:bodyPr>
+          <a:lstStyle/>
+          <a:p>
+            <a:pPr indent="0" lvl="0" marL="0" rtl="0" algn="ctr">
+              <a:spcBef>
+                <a:spcPts val="0"/>
+              </a:spcBef>
+              <a:spcAft>
+                <a:spcPts val="0"/>
+              </a:spcAft>
+              <a:buNone/>
+            </a:pPr>
+            <a:r>
+              <a:rPr lang="es"/>
+              <a:t>Reducciones Por Warp</a:t>
+            </a:r>
+            <a:endParaRPr/>
+          </a:p>
+        </p:txBody>
+      </p:sp>
+      <p:pic>
+        <p:nvPicPr>
+          <p:cNvPr id="117" name="Google Shape;117;p22" title="Fase1AW.png"/>
+          <p:cNvPicPr preferRelativeResize="0"/>
+          <p:nvPr/>
+        </p:nvPicPr>
+        <p:blipFill>
+          <a:blip r:embed="rId3">
+            <a:alphaModFix/>
+          </a:blip>
+          <a:stretch>
+            <a:fillRect/>
+          </a:stretch>
+        </p:blipFill>
+        <p:spPr>
+          <a:xfrm>
+            <a:off x="512699" y="1370662"/>
+            <a:ext cx="5239100" cy="766913"/>
+          </a:xfrm>
+          <a:prstGeom prst="rect">
+            <a:avLst/>
+          </a:prstGeom>
+          <a:noFill/>
+          <a:ln>
+            <a:noFill/>
+          </a:ln>
+        </p:spPr>
+      </p:pic>
+      <p:pic>
+        <p:nvPicPr>
+          <p:cNvPr id="118" name="Google Shape;118;p22" title="Fase2AW.png"/>
+          <p:cNvPicPr preferRelativeResize="0"/>
+          <p:nvPr/>
+        </p:nvPicPr>
+        <p:blipFill rotWithShape="1">
+          <a:blip r:embed="rId4">
+            <a:alphaModFix/>
+          </a:blip>
+          <a:srcRect b="0" l="0" r="0" t="0"/>
+          <a:stretch/>
+        </p:blipFill>
+        <p:spPr>
+          <a:xfrm>
+            <a:off x="512700" y="2310850"/>
+            <a:ext cx="5541000" cy="712650"/>
+          </a:xfrm>
+          <a:prstGeom prst="rect">
+            <a:avLst/>
+          </a:prstGeom>
+          <a:noFill/>
+          <a:ln>
+            <a:noFill/>
+          </a:ln>
+        </p:spPr>
+      </p:pic>
+      <p:pic>
+        <p:nvPicPr>
+          <p:cNvPr id="119" name="Google Shape;119;p22" title="Fase3.1AW.png"/>
+          <p:cNvPicPr preferRelativeResize="0"/>
+          <p:nvPr/>
+        </p:nvPicPr>
+        <p:blipFill>
+          <a:blip r:embed="rId5">
+            <a:alphaModFix/>
+          </a:blip>
+          <a:stretch>
+            <a:fillRect/>
+          </a:stretch>
+        </p:blipFill>
+        <p:spPr>
+          <a:xfrm>
+            <a:off x="512701" y="3196775"/>
+            <a:ext cx="5789126" cy="1915875"/>
+          </a:xfrm>
+          <a:prstGeom prst="rect">
+            <a:avLst/>
+          </a:prstGeom>
+          <a:noFill/>
+          <a:ln>
+            <a:noFill/>
+          </a:ln>
+        </p:spPr>
+      </p:pic>
+      <p:pic>
+        <p:nvPicPr>
+          <p:cNvPr id="120" name="Google Shape;120;p22" title="SumaMariposa.png"/>
+          <p:cNvPicPr preferRelativeResize="0"/>
+          <p:nvPr/>
+        </p:nvPicPr>
+        <p:blipFill>
+          <a:blip r:embed="rId6">
+            <a:alphaModFix/>
+          </a:blip>
+          <a:stretch>
+            <a:fillRect/>
+          </a:stretch>
+        </p:blipFill>
+        <p:spPr>
+          <a:xfrm>
+            <a:off x="1273885" y="1197375"/>
+            <a:ext cx="6596227" cy="3585226"/>
+          </a:xfrm>
+          <a:prstGeom prst="rect">
+            <a:avLst/>
+          </a:prstGeom>
+          <a:noFill/>
+          <a:ln>
+            <a:noFill/>
+          </a:ln>
+        </p:spPr>
+      </p:pic>
+    </p:spTree>
+  </p:cSld>
+  <p:clrMapOvr>
+    <a:masterClrMapping/>
+  </p:clrMapOvr>
+  <p:timing>
+    <p:tnLst>
+      <p:par>
+        <p:cTn dur="indefinite" nodeType="tmRoot" restart="never">
+          <p:childTnLst>
+            <p:seq concurrent="1" nextAc="seek">
+              <p:cTn dur="indefinite" id="2" nodeType="mainSeq">
+                <p:childTnLst>
+                  <p:par>
+                    <p:cTn fill="hold">
+                      <p:stCondLst>
+                        <p:cond delay="indefinite"/>
+                      </p:stCondLst>
+                      <p:childTnLst>
+                        <p:par>
+                          <p:cTn fill="hold">
+                            <p:stCondLst>
+                              <p:cond delay="0"/>
+                            </p:stCondLst>
+                            <p:childTnLst>
+                              <p:par>
+                                <p:cTn fill="hold" nodeType="clickEffect" presetClass="entr" presetID="1" presetSubtype="0">
+                                  <p:stCondLst>
+                                    <p:cond delay="0"/>
+                                  </p:stCondLst>
+                                  <p:childTnLst>
+                                    <p:set>
+                                      <p:cBhvr>
+                                        <p:cTn dur="1" fill="hold">
+                                          <p:stCondLst>
+                                            <p:cond delay="0"/>
+                                          </p:stCondLst>
+                                        </p:cTn>
+                                        <p:tgtEl>
+                                          <p:spTgt spid="117"/>
+                                        </p:tgtEl>
+                                        <p:attrNameLst>
+                                          <p:attrName>style.visibility</p:attrName>
+                                        </p:attrNameLst>
+                                      </p:cBhvr>
+                                      <p:to>
+                                        <p:strVal val="visible"/>
+                                      </p:to>
+                                    </p:set>
+                                  </p:childTnLst>
+                                </p:cTn>
+                              </p:par>
+                            </p:childTnLst>
+                          </p:cTn>
+                        </p:par>
+                      </p:childTnLst>
+                    </p:cTn>
+                  </p:par>
+                  <p:par>
+                    <p:cTn fill="hold">
+                      <p:stCondLst>
+                        <p:cond delay="indefinite"/>
+                      </p:stCondLst>
+                      <p:childTnLst>
+                        <p:par>
+                          <p:cTn fill="hold">
+                            <p:stCondLst>
+                              <p:cond delay="0"/>
+                            </p:stCondLst>
+                            <p:childTnLst>
+                              <p:par>
+                                <p:cTn fill="hold" nodeType="clickEffect" presetClass="entr" presetID="1" presetSubtype="0">
+                                  <p:stCondLst>
+                                    <p:cond delay="0"/>
+                                  </p:stCondLst>
+                                  <p:childTnLst>
+                                    <p:set>
+                                      <p:cBhvr>
+                                        <p:cTn dur="1" fill="hold">
+                                          <p:stCondLst>
+                                            <p:cond delay="0"/>
+                                          </p:stCondLst>
+                                        </p:cTn>
+                                        <p:tgtEl>
+                                          <p:spTgt spid="118"/>
+                                        </p:tgtEl>
+                                        <p:attrNameLst>
+                                          <p:attrName>style.visibility</p:attrName>
+                                        </p:attrNameLst>
+                                      </p:cBhvr>
+                                      <p:to>
+                                        <p:strVal val="visible"/>
+                                      </p:to>
+                                    </p:set>
+                                  </p:childTnLst>
+                                </p:cTn>
+                              </p:par>
+                            </p:childTnLst>
+                          </p:cTn>
+                        </p:par>
+                      </p:childTnLst>
+                    </p:cTn>
+                  </p:par>
+                  <p:par>
+                    <p:cTn fill="hold">
+                      <p:stCondLst>
+                        <p:cond delay="indefinite"/>
+                      </p:stCondLst>
+                      <p:childTnLst>
+                        <p:par>
+                          <p:cTn fill="hold">
+                            <p:stCondLst>
+                              <p:cond delay="0"/>
+                            </p:stCondLst>
+                            <p:childTnLst>
+                              <p:par>
+                                <p:cTn fill="hold" nodeType="clickEffect" presetClass="entr" presetID="1" presetSubtype="0">
+                                  <p:stCondLst>
+                                    <p:cond delay="0"/>
+                                  </p:stCondLst>
+                                  <p:childTnLst>
+                                    <p:set>
+                                      <p:cBhvr>
+                                        <p:cTn dur="1" fill="hold">
+                                          <p:stCondLst>
+                                            <p:cond delay="0"/>
+                                          </p:stCondLst>
+                                        </p:cTn>
+                                        <p:tgtEl>
+                                          <p:spTgt spid="119"/>
+                                        </p:tgtEl>
+                                        <p:attrNameLst>
+                                          <p:attrName>style.visibility</p:attrName>
+                                        </p:attrNameLst>
+                                      </p:cBhvr>
+                                      <p:to>
+                                        <p:strVal val="visible"/>
+                                      </p:to>
+                                    </p:set>
+                                  </p:childTnLst>
+                                </p:cTn>
+                              </p:par>
+                            </p:childTnLst>
+                          </p:cTn>
+                        </p:par>
+                      </p:childTnLst>
+                    </p:cTn>
+                  </p:par>
+                  <p:par>
+                    <p:cTn fill="hold">
+                      <p:stCondLst>
+                        <p:cond delay="indefinite"/>
+                      </p:stCondLst>
+                      <p:childTnLst>
+                        <p:par>
+                          <p:cTn fill="hold">
+                            <p:stCondLst>
+                              <p:cond delay="0"/>
+                            </p:stCondLst>
+                            <p:childTnLst>
+                              <p:par>
+                                <p:cTn fill="hold" nodeType="clickEffect" presetClass="exit" presetID="1" presetSubtype="0">
+                                  <p:stCondLst>
+                                    <p:cond delay="0"/>
+                                  </p:stCondLst>
+                                  <p:childTnLst>
+                                    <p:set>
+                                      <p:cBhvr>
+                                        <p:cTn dur="1" fill="hold">
+                                          <p:stCondLst>
+                                            <p:cond delay="0"/>
+                                          </p:stCondLst>
+                                        </p:cTn>
+                                        <p:tgtEl>
+                                          <p:spTgt spid="117"/>
+                                        </p:tgtEl>
+                                        <p:attrNameLst>
+                                          <p:attrName>style.visibility</p:attrName>
+                                        </p:attrNameLst>
+                                      </p:cBhvr>
+                                      <p:to>
+                                        <p:strVal val="hidden"/>
+                                      </p:to>
+                                    </p:set>
+                                  </p:childTnLst>
+                                </p:cTn>
+                              </p:par>
+                              <p:par>
+                                <p:cTn fill="hold" nodeType="withEffect" presetClass="exit" presetID="1" presetSubtype="0">
+                                  <p:stCondLst>
+                                    <p:cond delay="0"/>
+                                  </p:stCondLst>
+                                  <p:childTnLst>
+                                    <p:set>
+                                      <p:cBhvr>
+                                        <p:cTn dur="1" fill="hold">
+                                          <p:stCondLst>
+                                            <p:cond delay="0"/>
+                                          </p:stCondLst>
+                                        </p:cTn>
+                                        <p:tgtEl>
+                                          <p:spTgt spid="118"/>
+                                        </p:tgtEl>
+                                        <p:attrNameLst>
+                                          <p:attrName>style.visibility</p:attrName>
+                                        </p:attrNameLst>
+                                      </p:cBhvr>
+                                      <p:to>
+                                        <p:strVal val="hidden"/>
+                                      </p:to>
+                                    </p:set>
+                                  </p:childTnLst>
+                                </p:cTn>
+                              </p:par>
+                              <p:par>
+                                <p:cTn fill="hold" nodeType="withEffect" presetClass="exit" presetID="1" presetSubtype="0">
+                                  <p:stCondLst>
+                                    <p:cond delay="0"/>
+                                  </p:stCondLst>
+                                  <p:childTnLst>
+                                    <p:set>
+                                      <p:cBhvr>
+                                        <p:cTn dur="1" fill="hold">
+                                          <p:stCondLst>
+                                            <p:cond delay="0"/>
+                                          </p:stCondLst>
+                                        </p:cTn>
+                                        <p:tgtEl>
+                                          <p:spTgt spid="119"/>
+                                        </p:tgtEl>
+                                        <p:attrNameLst>
+                                          <p:attrName>style.visibility</p:attrName>
+                                        </p:attrNameLst>
+                                      </p:cBhvr>
+                                      <p:to>
+                                        <p:strVal val="hidden"/>
+                                      </p:to>
+                                    </p:set>
+                                  </p:childTnLst>
+                                </p:cTn>
+                              </p:par>
+                            </p:childTnLst>
+                          </p:cTn>
+                        </p:par>
+                        <p:par>
+                          <p:cTn fill="hold">
+                            <p:stCondLst>
+                              <p:cond delay="0"/>
+                            </p:stCondLst>
+                            <p:childTnLst>
+                              <p:par>
+                                <p:cTn fill="hold" nodeType="afterEffect" presetClass="entr" presetID="1" presetSubtype="0">
+                                  <p:stCondLst>
+                                    <p:cond delay="0"/>
+                                  </p:stCondLst>
+                                  <p:childTnLst>
+                                    <p:set>
+                                      <p:cBhvr>
+                                        <p:cTn dur="1" fill="hold">
+                                          <p:stCondLst>
+                                            <p:cond delay="0"/>
+                                          </p:stCondLst>
+                                        </p:cTn>
+                                        <p:tgtEl>
+                                          <p:spTgt spid="120"/>
+                                        </p:tgtEl>
+                                        <p:attrNameLst>
+                                          <p:attrName>style.visibility</p:attrName>
+                                        </p:attrNameLst>
+                                      </p:cBhvr>
+                                      <p:to>
+                                        <p:strVal val="visible"/>
+                                      </p:to>
+                                    </p:set>
+                                  </p:childTnLst>
+                                </p:cTn>
+                              </p:par>
+                            </p:childTnLst>
+                          </p:cTn>
+                        </p:par>
+                      </p:childTnLst>
+                    </p:cTn>
+                  </p:par>
+                </p:childTnLst>
+              </p:cTn>
+              <p:prevCondLst>
+                <p:cond evt="onPrev">
+                  <p:tgtEl>
+                    <p:sldTgt/>
+                  </p:tgtEl>
+                </p:cond>
+              </p:prevCondLst>
+              <p:nextCondLst>
+                <p:cond evt="onNext">
+                  <p:tgtEl>
+                    <p:sldTgt/>
+                  </p:tgtEl>
+                </p:cond>
+              </p:nextCondLst>
+            </p:seq>
+          </p:childTnLst>
+        </p:cTn>
+      </p:par>
+    </p:tnLst>
+  </p:timing>
+</p:sld>
+</file>
+
+<file path=ppt/slides/slide11.xml><?xml version="1.0" encoding="utf-8"?>
+<p:sld xmlns:a="http://schemas.openxmlformats.org/drawingml/2006/main" xmlns:r="http://schemas.openxmlformats.org/officeDocument/2006/relationships" xmlns:mc="http://schemas.openxmlformats.org/markup-compatibility/2006" xmlns:mv="urn:schemas-microsoft-com:mac:vml" xmlns:p="http://schemas.openxmlformats.org/presentationml/2006/main" xmlns:c="http://schemas.openxmlformats.org/drawingml/2006/chart" xmlns:dgm="http://schemas.openxmlformats.org/drawingml/2006/diagram" xmlns:o="urn:schemas-microsoft-com:office:office" xmlns:v="urn:schemas-microsoft-com:vml" xmlns:pvml="urn:schemas-microsoft-com:office:powerpoint" xmlns:com="http://schemas.openxmlformats.org/drawingml/2006/compatibility" xmlns:p14="http://schemas.microsoft.com/office/powerpoint/2010/main" xmlns:p15="http://schemas.microsoft.com/office/powerpoint/2012/main" xmlns:ahyp="http://schemas.microsoft.com/office/drawing/2018/hyperlinkcolor">
+  <p:cSld>
+    <p:spTree>
+      <p:nvGrpSpPr>
+        <p:cNvPr id="124" name="Shape 124"/>
+        <p:cNvGrpSpPr/>
+        <p:nvPr/>
+      </p:nvGrpSpPr>
+      <p:grpSpPr>
+        <a:xfrm>
+          <a:off x="0" y="0"/>
+          <a:ext cx="0" cy="0"/>
+          <a:chOff x="0" y="0"/>
+          <a:chExt cx="0" cy="0"/>
+        </a:xfrm>
+      </p:grpSpPr>
+      <p:sp>
+        <p:nvSpPr>
+          <p:cNvPr id="125" name="Google Shape;125;p23"/>
           <p:cNvSpPr txBox="1"/>
           <p:nvPr>
             <p:ph type="title"/>
@@ -10658,7 +11252,7 @@
       </p:sp>
       <p:pic>
         <p:nvPicPr>
-          <p:cNvPr id="122" name="Google Shape;122;p22" title="Ajuste de Parámetros.png"/>
+          <p:cNvPr id="126" name="Google Shape;126;p23" title="Ajuste de Parámetros.png"/>
           <p:cNvPicPr preferRelativeResize="0"/>
           <p:nvPr/>
         </p:nvPicPr>
@@ -10686,7 +11280,7 @@
       </p:pic>
       <p:pic>
         <p:nvPicPr>
-          <p:cNvPr id="123" name="Google Shape;123;p22" title="Tamaños.png"/>
+          <p:cNvPr id="127" name="Google Shape;127;p23" title="Tamaños.png"/>
           <p:cNvPicPr preferRelativeResize="0"/>
           <p:nvPr/>
         </p:nvPicPr>
@@ -10751,7 +11345,7 @@
                                           </p:stCondLst>
                                         </p:cTn>
                                         <p:tgtEl>
-                                          <p:spTgt spid="122"/>
+                                          <p:spTgt spid="126"/>
                                         </p:tgtEl>
                                         <p:attrNameLst>
                                           <p:attrName>style.visibility</p:attrName>
@@ -10787,7 +11381,7 @@
                                           </p:stCondLst>
                                         </p:cTn>
                                         <p:tgtEl>
-                                          <p:spTgt spid="123"/>
+                                          <p:spTgt spid="127"/>
                                         </p:tgtEl>
                                         <p:attrNameLst>
                                           <p:attrName>style.visibility</p:attrName>
@@ -10831,12 +11425,12 @@
 </p:sld>
 </file>
 
-<file path=ppt/slides/slide11.xml><?xml version="1.0" encoding="utf-8"?>
+<file path=ppt/slides/slide12.xml><?xml version="1.0" encoding="utf-8"?>
 <p:sld xmlns:a="http://schemas.openxmlformats.org/drawingml/2006/main" xmlns:r="http://schemas.openxmlformats.org/officeDocument/2006/relationships" xmlns:mc="http://schemas.openxmlformats.org/markup-compatibility/2006" xmlns:mv="urn:schemas-microsoft-com:mac:vml" xmlns:p="http://schemas.openxmlformats.org/presentationml/2006/main" xmlns:c="http://schemas.openxmlformats.org/drawingml/2006/chart" xmlns:dgm="http://schemas.openxmlformats.org/drawingml/2006/diagram" xmlns:o="urn:schemas-microsoft-com:office:office" xmlns:v="urn:schemas-microsoft-com:vml" xmlns:pvml="urn:schemas-microsoft-com:office:powerpoint" xmlns:com="http://schemas.openxmlformats.org/drawingml/2006/compatibility" xmlns:p14="http://schemas.microsoft.com/office/powerpoint/2010/main" xmlns:p15="http://schemas.microsoft.com/office/powerpoint/2012/main" xmlns:ahyp="http://schemas.microsoft.com/office/drawing/2018/hyperlinkcolor">
   <p:cSld>
     <p:spTree>
       <p:nvGrpSpPr>
-        <p:cNvPr id="127" name="Shape 127"/>
+        <p:cNvPr id="131" name="Shape 131"/>
         <p:cNvGrpSpPr/>
         <p:nvPr/>
       </p:nvGrpSpPr>
@@ -10850,7 +11444,7 @@
       </p:grpSpPr>
       <p:sp>
         <p:nvSpPr>
-          <p:cNvPr id="128" name="Google Shape;128;p23"/>
+          <p:cNvPr id="132" name="Google Shape;132;p24"/>
           <p:cNvSpPr txBox="1"/>
           <p:nvPr>
             <p:ph type="title"/>
@@ -10896,12 +11490,12 @@
 </p:sld>
 </file>
 
-<file path=ppt/slides/slide12.xml><?xml version="1.0" encoding="utf-8"?>
+<file path=ppt/slides/slide13.xml><?xml version="1.0" encoding="utf-8"?>
 <p:sld xmlns:a="http://schemas.openxmlformats.org/drawingml/2006/main" xmlns:r="http://schemas.openxmlformats.org/officeDocument/2006/relationships" xmlns:mc="http://schemas.openxmlformats.org/markup-compatibility/2006" xmlns:mv="urn:schemas-microsoft-com:mac:vml" xmlns:p="http://schemas.openxmlformats.org/presentationml/2006/main" xmlns:c="http://schemas.openxmlformats.org/drawingml/2006/chart" xmlns:dgm="http://schemas.openxmlformats.org/drawingml/2006/diagram" xmlns:o="urn:schemas-microsoft-com:office:office" xmlns:v="urn:schemas-microsoft-com:vml" xmlns:pvml="urn:schemas-microsoft-com:office:powerpoint" xmlns:com="http://schemas.openxmlformats.org/drawingml/2006/compatibility" xmlns:p14="http://schemas.microsoft.com/office/powerpoint/2010/main" xmlns:p15="http://schemas.microsoft.com/office/powerpoint/2012/main" xmlns:ahyp="http://schemas.microsoft.com/office/drawing/2018/hyperlinkcolor">
   <p:cSld>
     <p:spTree>
       <p:nvGrpSpPr>
-        <p:cNvPr id="132" name="Shape 132"/>
+        <p:cNvPr id="136" name="Shape 136"/>
         <p:cNvGrpSpPr/>
         <p:nvPr/>
       </p:nvGrpSpPr>
@@ -10915,7 +11509,7 @@
       </p:grpSpPr>
       <p:sp>
         <p:nvSpPr>
-          <p:cNvPr id="133" name="Google Shape;133;p24"/>
+          <p:cNvPr id="137" name="Google Shape;137;p25"/>
           <p:cNvSpPr txBox="1"/>
           <p:nvPr>
             <p:ph type="title"/>
@@ -10955,7 +11549,7 @@
       </p:sp>
       <p:pic>
         <p:nvPicPr>
-          <p:cNvPr id="134" name="Google Shape;134;p24" title="Atom vs Jupiterace.png"/>
+          <p:cNvPr id="138" name="Google Shape;138;p25" title="Atom vs Jupiterace.png"/>
           <p:cNvPicPr preferRelativeResize="0"/>
           <p:nvPr/>
         </p:nvPicPr>
@@ -10983,7 +11577,7 @@
       </p:pic>
       <p:pic>
         <p:nvPicPr>
-          <p:cNvPr id="135" name="Google Shape;135;p24" title="Lab3 vs Lab4.png"/>
+          <p:cNvPr id="139" name="Google Shape;139;p25" title="Lab3 vs Lab4.png"/>
           <p:cNvPicPr preferRelativeResize="0"/>
           <p:nvPr/>
         </p:nvPicPr>
@@ -11048,7 +11642,7 @@
                                           </p:stCondLst>
                                         </p:cTn>
                                         <p:tgtEl>
-                                          <p:spTgt spid="135"/>
+                                          <p:spTgt spid="139"/>
                                         </p:tgtEl>
                                         <p:attrNameLst>
                                           <p:attrName>style.visibility</p:attrName>
@@ -11084,7 +11678,7 @@
                                           </p:stCondLst>
                                         </p:cTn>
                                         <p:tgtEl>
-                                          <p:spTgt spid="134"/>
+                                          <p:spTgt spid="138"/>
                                         </p:tgtEl>
                                         <p:attrNameLst>
                                           <p:attrName>style.visibility</p:attrName>
@@ -11128,12 +11722,12 @@
 </p:sld>
 </file>
 
-<file path=ppt/slides/slide13.xml><?xml version="1.0" encoding="utf-8"?>
+<file path=ppt/slides/slide14.xml><?xml version="1.0" encoding="utf-8"?>
 <p:sld xmlns:a="http://schemas.openxmlformats.org/drawingml/2006/main" xmlns:r="http://schemas.openxmlformats.org/officeDocument/2006/relationships" xmlns:mc="http://schemas.openxmlformats.org/markup-compatibility/2006" xmlns:mv="urn:schemas-microsoft-com:mac:vml" xmlns:p="http://schemas.openxmlformats.org/presentationml/2006/main" xmlns:c="http://schemas.openxmlformats.org/drawingml/2006/chart" xmlns:dgm="http://schemas.openxmlformats.org/drawingml/2006/diagram" xmlns:o="urn:schemas-microsoft-com:office:office" xmlns:v="urn:schemas-microsoft-com:vml" xmlns:pvml="urn:schemas-microsoft-com:office:powerpoint" xmlns:com="http://schemas.openxmlformats.org/drawingml/2006/compatibility" xmlns:p14="http://schemas.microsoft.com/office/powerpoint/2010/main" xmlns:p15="http://schemas.microsoft.com/office/powerpoint/2012/main" xmlns:ahyp="http://schemas.microsoft.com/office/drawing/2018/hyperlinkcolor">
   <p:cSld>
     <p:spTree>
       <p:nvGrpSpPr>
-        <p:cNvPr id="139" name="Shape 139"/>
+        <p:cNvPr id="143" name="Shape 143"/>
         <p:cNvGrpSpPr/>
         <p:nvPr/>
       </p:nvGrpSpPr>
@@ -11147,7 +11741,7 @@
       </p:grpSpPr>
       <p:sp>
         <p:nvSpPr>
-          <p:cNvPr id="140" name="Google Shape;140;p25"/>
+          <p:cNvPr id="144" name="Google Shape;144;p26"/>
           <p:cNvSpPr txBox="1"/>
           <p:nvPr>
             <p:ph type="title"/>
@@ -11187,7 +11781,7 @@
       </p:sp>
       <p:sp>
         <p:nvSpPr>
-          <p:cNvPr id="141" name="Google Shape;141;p25"/>
+          <p:cNvPr id="145" name="Google Shape;145;p26"/>
           <p:cNvSpPr txBox="1"/>
           <p:nvPr>
             <p:ph idx="1" type="body"/>
@@ -11264,7 +11858,7 @@
                                           </p:stCondLst>
                                         </p:cTn>
                                         <p:tgtEl>
-                                          <p:spTgt spid="140"/>
+                                          <p:spTgt spid="144"/>
                                         </p:tgtEl>
                                         <p:attrNameLst>
                                           <p:attrName>style.visibility</p:attrName>
@@ -12344,13 +12938,13 @@
           <p:cNvPr id="91" name="Google Shape;91;p18"/>
           <p:cNvSpPr txBox="1"/>
           <p:nvPr>
-            <p:ph type="ctrTitle"/>
+            <p:ph idx="4294967295" type="title"/>
           </p:nvPr>
         </p:nvSpPr>
         <p:spPr>
           <a:xfrm>
-            <a:off x="512700" y="1893300"/>
-            <a:ext cx="8118600" cy="1522800"/>
+            <a:off x="512640" y="1893240"/>
+            <a:ext cx="8118300" cy="1522500"/>
           </a:xfrm>
           <a:prstGeom prst="rect">
             <a:avLst/>
@@ -12366,76 +12960,35 @@
           </a:bodyPr>
           <a:lstStyle/>
           <a:p>
-            <a:pPr indent="0" lvl="0" marL="0" rtl="0" algn="l">
-              <a:lnSpc>
-                <a:spcPct val="100000"/>
-              </a:lnSpc>
-              <a:spcBef>
-                <a:spcPts val="0"/>
-              </a:spcBef>
-              <a:spcAft>
-                <a:spcPts val="0"/>
-              </a:spcAft>
-              <a:buSzPts val="4200"/>
+            <a:pPr indent="0" lvl="0" marL="0" marR="0" rtl="0" algn="l">
+              <a:spcBef>
+                <a:spcPts val="0"/>
+              </a:spcBef>
+              <a:spcAft>
+                <a:spcPts val="0"/>
+              </a:spcAft>
+              <a:buSzPts val="6000"/>
+              <a:buFont typeface="Arial"/>
               <a:buNone/>
             </a:pPr>
             <a:r>
               <a:t/>
             </a:r>
-            <a:endParaRPr/>
-          </a:p>
-        </p:txBody>
-      </p:sp>
-      <p:sp>
-        <p:nvSpPr>
-          <p:cNvPr id="92" name="Google Shape;92;p18"/>
-          <p:cNvSpPr txBox="1"/>
-          <p:nvPr>
-            <p:ph idx="1" type="subTitle"/>
-          </p:nvPr>
-        </p:nvSpPr>
-        <p:spPr>
-          <a:xfrm>
-            <a:off x="512700" y="3840639"/>
-            <a:ext cx="8118600" cy="787500"/>
-          </a:xfrm>
-          <a:prstGeom prst="rect">
-            <a:avLst/>
-          </a:prstGeom>
-          <a:noFill/>
-          <a:ln>
-            <a:noFill/>
-          </a:ln>
-        </p:spPr>
-        <p:txBody>
-          <a:bodyPr anchorCtr="0" anchor="t" bIns="91425" lIns="91425" spcFirstLastPara="1" rIns="91425" wrap="square" tIns="91425">
-            <a:noAutofit/>
-          </a:bodyPr>
-          <a:lstStyle/>
-          <a:p>
-            <a:pPr indent="0" lvl="0" marL="0" rtl="0" algn="l">
-              <a:lnSpc>
-                <a:spcPct val="100000"/>
-              </a:lnSpc>
-              <a:spcBef>
-                <a:spcPts val="0"/>
-              </a:spcBef>
-              <a:spcAft>
-                <a:spcPts val="0"/>
-              </a:spcAft>
-              <a:buSzPts val="2400"/>
-              <a:buNone/>
-            </a:pPr>
-            <a:r>
-              <a:t/>
-            </a:r>
-            <a:endParaRPr/>
+            <a:endParaRPr b="0" i="0" sz="6000" u="none" cap="none" strike="noStrike">
+              <a:solidFill>
+                <a:schemeClr val="accent1"/>
+              </a:solidFill>
+              <a:latin typeface="Old Standard TT"/>
+              <a:ea typeface="Old Standard TT"/>
+              <a:cs typeface="Old Standard TT"/>
+              <a:sym typeface="Old Standard TT"/>
+            </a:endParaRPr>
           </a:p>
         </p:txBody>
       </p:sp>
       <p:pic>
         <p:nvPicPr>
-          <p:cNvPr id="93" name="Google Shape;93;p18" title="Screenshot from 2025-06-16 22-05-43.png"/>
+          <p:cNvPr id="92" name="Google Shape;92;p18"/>
           <p:cNvPicPr preferRelativeResize="0"/>
           <p:nvPr/>
         </p:nvPicPr>
@@ -12448,8 +13001,8 @@
         </p:blipFill>
         <p:spPr>
           <a:xfrm>
-            <a:off x="-955050" y="0"/>
-            <a:ext cx="11054100" cy="4761200"/>
+            <a:off x="56520" y="62280"/>
+            <a:ext cx="8858880" cy="5195520"/>
           </a:xfrm>
           <a:prstGeom prst="rect">
             <a:avLst/>
@@ -12473,7 +13026,7 @@
   <p:cSld>
     <p:spTree>
       <p:nvGrpSpPr>
-        <p:cNvPr id="97" name="Shape 97"/>
+        <p:cNvPr id="96" name="Shape 96"/>
         <p:cNvGrpSpPr/>
         <p:nvPr/>
       </p:nvGrpSpPr>
@@ -12487,153 +13040,7 @@
       </p:grpSpPr>
       <p:sp>
         <p:nvSpPr>
-          <p:cNvPr id="98" name="Google Shape;98;p19"/>
-          <p:cNvSpPr txBox="1"/>
-          <p:nvPr>
-            <p:ph type="ctrTitle"/>
-          </p:nvPr>
-        </p:nvSpPr>
-        <p:spPr>
-          <a:xfrm>
-            <a:off x="512700" y="1893300"/>
-            <a:ext cx="8118600" cy="1522800"/>
-          </a:xfrm>
-          <a:prstGeom prst="rect">
-            <a:avLst/>
-          </a:prstGeom>
-          <a:noFill/>
-          <a:ln>
-            <a:noFill/>
-          </a:ln>
-        </p:spPr>
-        <p:txBody>
-          <a:bodyPr anchorCtr="0" anchor="b" bIns="91425" lIns="91425" spcFirstLastPara="1" rIns="91425" wrap="square" tIns="91425">
-            <a:noAutofit/>
-          </a:bodyPr>
-          <a:lstStyle/>
-          <a:p>
-            <a:pPr indent="0" lvl="0" marL="0" rtl="0" algn="l">
-              <a:lnSpc>
-                <a:spcPct val="100000"/>
-              </a:lnSpc>
-              <a:spcBef>
-                <a:spcPts val="0"/>
-              </a:spcBef>
-              <a:spcAft>
-                <a:spcPts val="0"/>
-              </a:spcAft>
-              <a:buSzPts val="4200"/>
-              <a:buNone/>
-            </a:pPr>
-            <a:r>
-              <a:t/>
-            </a:r>
-            <a:endParaRPr/>
-          </a:p>
-        </p:txBody>
-      </p:sp>
-      <p:sp>
-        <p:nvSpPr>
-          <p:cNvPr id="99" name="Google Shape;99;p19"/>
-          <p:cNvSpPr txBox="1"/>
-          <p:nvPr>
-            <p:ph idx="1" type="subTitle"/>
-          </p:nvPr>
-        </p:nvSpPr>
-        <p:spPr>
-          <a:xfrm>
-            <a:off x="512700" y="3840639"/>
-            <a:ext cx="8118600" cy="787500"/>
-          </a:xfrm>
-          <a:prstGeom prst="rect">
-            <a:avLst/>
-          </a:prstGeom>
-          <a:noFill/>
-          <a:ln>
-            <a:noFill/>
-          </a:ln>
-        </p:spPr>
-        <p:txBody>
-          <a:bodyPr anchorCtr="0" anchor="t" bIns="91425" lIns="91425" spcFirstLastPara="1" rIns="91425" wrap="square" tIns="91425">
-            <a:noAutofit/>
-          </a:bodyPr>
-          <a:lstStyle/>
-          <a:p>
-            <a:pPr indent="0" lvl="0" marL="0" rtl="0" algn="l">
-              <a:lnSpc>
-                <a:spcPct val="100000"/>
-              </a:lnSpc>
-              <a:spcBef>
-                <a:spcPts val="0"/>
-              </a:spcBef>
-              <a:spcAft>
-                <a:spcPts val="0"/>
-              </a:spcAft>
-              <a:buSzPts val="2400"/>
-              <a:buNone/>
-            </a:pPr>
-            <a:r>
-              <a:t/>
-            </a:r>
-            <a:endParaRPr/>
-          </a:p>
-        </p:txBody>
-      </p:sp>
-      <p:pic>
-        <p:nvPicPr>
-          <p:cNvPr id="100" name="Google Shape;100;p19" title="Screenshot from 2025-06-16 21-16-52.png"/>
-          <p:cNvPicPr preferRelativeResize="0"/>
-          <p:nvPr/>
-        </p:nvPicPr>
-        <p:blipFill rotWithShape="1">
-          <a:blip r:embed="rId3">
-            <a:alphaModFix/>
-          </a:blip>
-          <a:srcRect b="0" l="0" r="0" t="0"/>
-          <a:stretch/>
-        </p:blipFill>
-        <p:spPr>
-          <a:xfrm>
-            <a:off x="129300" y="-545730"/>
-            <a:ext cx="9014700" cy="6325692"/>
-          </a:xfrm>
-          <a:prstGeom prst="rect">
-            <a:avLst/>
-          </a:prstGeom>
-          <a:noFill/>
-          <a:ln>
-            <a:noFill/>
-          </a:ln>
-        </p:spPr>
-      </p:pic>
-    </p:spTree>
-  </p:cSld>
-  <p:clrMapOvr>
-    <a:masterClrMapping/>
-  </p:clrMapOvr>
-</p:sld>
-</file>
-
-<file path=ppt/slides/slide8.xml><?xml version="1.0" encoding="utf-8"?>
-<p:sld xmlns:a="http://schemas.openxmlformats.org/drawingml/2006/main" xmlns:r="http://schemas.openxmlformats.org/officeDocument/2006/relationships" xmlns:mc="http://schemas.openxmlformats.org/markup-compatibility/2006" xmlns:mv="urn:schemas-microsoft-com:mac:vml" xmlns:p="http://schemas.openxmlformats.org/presentationml/2006/main" xmlns:c="http://schemas.openxmlformats.org/drawingml/2006/chart" xmlns:dgm="http://schemas.openxmlformats.org/drawingml/2006/diagram" xmlns:o="urn:schemas-microsoft-com:office:office" xmlns:v="urn:schemas-microsoft-com:vml" xmlns:pvml="urn:schemas-microsoft-com:office:powerpoint" xmlns:com="http://schemas.openxmlformats.org/drawingml/2006/compatibility" xmlns:p14="http://schemas.microsoft.com/office/powerpoint/2010/main" xmlns:p15="http://schemas.microsoft.com/office/powerpoint/2012/main" xmlns:ahyp="http://schemas.microsoft.com/office/drawing/2018/hyperlinkcolor">
-  <p:cSld>
-    <p:spTree>
-      <p:nvGrpSpPr>
-        <p:cNvPr id="104" name="Shape 104"/>
-        <p:cNvGrpSpPr/>
-        <p:nvPr/>
-      </p:nvGrpSpPr>
-      <p:grpSpPr>
-        <a:xfrm>
-          <a:off x="0" y="0"/>
-          <a:ext cx="0" cy="0"/>
-          <a:chOff x="0" y="0"/>
-          <a:chExt cx="0" cy="0"/>
-        </a:xfrm>
-      </p:grpSpPr>
-      <p:sp>
-        <p:nvSpPr>
-          <p:cNvPr id="105" name="Google Shape;105;p20"/>
+          <p:cNvPr id="97" name="Google Shape;97;p19"/>
           <p:cNvSpPr txBox="1"/>
           <p:nvPr>
             <p:ph type="title"/>
@@ -12680,7 +13087,7 @@
       </p:sp>
       <p:pic>
         <p:nvPicPr>
-          <p:cNvPr id="106" name="Google Shape;106;p20"/>
+          <p:cNvPr id="98" name="Google Shape;98;p19"/>
           <p:cNvPicPr preferRelativeResize="0"/>
           <p:nvPr/>
         </p:nvPicPr>
@@ -12713,12 +13120,12 @@
 </p:sld>
 </file>
 
-<file path=ppt/slides/slide9.xml><?xml version="1.0" encoding="utf-8"?>
+<file path=ppt/slides/slide8.xml><?xml version="1.0" encoding="utf-8"?>
 <p:sld xmlns:a="http://schemas.openxmlformats.org/drawingml/2006/main" xmlns:r="http://schemas.openxmlformats.org/officeDocument/2006/relationships" xmlns:mc="http://schemas.openxmlformats.org/markup-compatibility/2006" xmlns:mv="urn:schemas-microsoft-com:mac:vml" xmlns:p="http://schemas.openxmlformats.org/presentationml/2006/main" xmlns:c="http://schemas.openxmlformats.org/drawingml/2006/chart" xmlns:dgm="http://schemas.openxmlformats.org/drawingml/2006/diagram" xmlns:o="urn:schemas-microsoft-com:office:office" xmlns:v="urn:schemas-microsoft-com:vml" xmlns:pvml="urn:schemas-microsoft-com:office:powerpoint" xmlns:com="http://schemas.openxmlformats.org/drawingml/2006/compatibility" xmlns:p14="http://schemas.microsoft.com/office/powerpoint/2010/main" xmlns:p15="http://schemas.microsoft.com/office/powerpoint/2012/main" xmlns:ahyp="http://schemas.microsoft.com/office/drawing/2018/hyperlinkcolor">
   <p:cSld>
     <p:spTree>
       <p:nvGrpSpPr>
-        <p:cNvPr id="110" name="Shape 110"/>
+        <p:cNvPr id="102" name="Shape 102"/>
         <p:cNvGrpSpPr/>
         <p:nvPr/>
       </p:nvGrpSpPr>
@@ -12730,118 +13137,23 @@
           <a:chExt cx="0" cy="0"/>
         </a:xfrm>
       </p:grpSpPr>
-      <p:sp>
-        <p:nvSpPr>
-          <p:cNvPr id="111" name="Google Shape;111;p21"/>
-          <p:cNvSpPr/>
-          <p:nvPr/>
-        </p:nvSpPr>
-        <p:spPr>
-          <a:xfrm>
-            <a:off x="204225" y="1370650"/>
-            <a:ext cx="1676700" cy="3517200"/>
-          </a:xfrm>
-          <a:prstGeom prst="rect">
-            <a:avLst/>
-          </a:prstGeom>
-          <a:solidFill>
-            <a:schemeClr val="dk1"/>
-          </a:solidFill>
-          <a:ln cap="flat" cmpd="sng" w="9525">
-            <a:solidFill>
-              <a:schemeClr val="dk1"/>
-            </a:solidFill>
-            <a:prstDash val="solid"/>
-            <a:round/>
-            <a:headEnd len="sm" w="sm" type="none"/>
-            <a:tailEnd len="sm" w="sm" type="none"/>
-          </a:ln>
-        </p:spPr>
-        <p:txBody>
-          <a:bodyPr anchorCtr="0" anchor="ctr" bIns="91425" lIns="91425" spcFirstLastPara="1" rIns="91425" wrap="square" tIns="91425">
-            <a:noAutofit/>
-          </a:bodyPr>
-          <a:lstStyle/>
-          <a:p>
-            <a:pPr indent="0" lvl="0" marL="0" rtl="0" algn="ctr">
-              <a:spcBef>
-                <a:spcPts val="0"/>
-              </a:spcBef>
-              <a:spcAft>
-                <a:spcPts val="0"/>
-              </a:spcAft>
-              <a:buNone/>
-            </a:pPr>
-            <a:r>
-              <a:t/>
-            </a:r>
-            <a:endParaRPr>
-              <a:latin typeface="Old Standard TT"/>
-              <a:ea typeface="Old Standard TT"/>
-              <a:cs typeface="Old Standard TT"/>
-              <a:sym typeface="Old Standard TT"/>
-            </a:endParaRPr>
-          </a:p>
-        </p:txBody>
-      </p:sp>
-      <p:sp>
-        <p:nvSpPr>
-          <p:cNvPr id="112" name="Google Shape;112;p21"/>
-          <p:cNvSpPr txBox="1"/>
-          <p:nvPr>
-            <p:ph type="title"/>
-          </p:nvPr>
-        </p:nvSpPr>
-        <p:spPr>
-          <a:xfrm>
-            <a:off x="512700" y="231975"/>
-            <a:ext cx="8118600" cy="965400"/>
-          </a:xfrm>
-          <a:prstGeom prst="rect">
-            <a:avLst/>
-          </a:prstGeom>
-        </p:spPr>
-        <p:txBody>
-          <a:bodyPr anchorCtr="0" anchor="b" bIns="91425" lIns="91425" spcFirstLastPara="1" rIns="91425" wrap="square" tIns="91425">
-            <a:noAutofit/>
-          </a:bodyPr>
-          <a:lstStyle/>
-          <a:p>
-            <a:pPr indent="0" lvl="0" marL="0" rtl="0" algn="ctr">
-              <a:spcBef>
-                <a:spcPts val="0"/>
-              </a:spcBef>
-              <a:spcAft>
-                <a:spcPts val="0"/>
-              </a:spcAft>
-              <a:buNone/>
-            </a:pPr>
-            <a:r>
-              <a:rPr lang="es"/>
-              <a:t>Reducciones Por Warp</a:t>
-            </a:r>
-            <a:endParaRPr/>
-          </a:p>
-        </p:txBody>
-      </p:sp>
       <p:pic>
         <p:nvPicPr>
-          <p:cNvPr id="113" name="Google Shape;113;p21" title="Fase1AW.png"/>
+          <p:cNvPr id="103" name="Google Shape;103;p20"/>
           <p:cNvPicPr preferRelativeResize="0"/>
           <p:nvPr/>
         </p:nvPicPr>
-        <p:blipFill>
+        <p:blipFill rotWithShape="1">
           <a:blip r:embed="rId3">
             <a:alphaModFix/>
           </a:blip>
-          <a:stretch>
-            <a:fillRect/>
-          </a:stretch>
+          <a:srcRect b="0" l="0" r="0" t="0"/>
+          <a:stretch/>
         </p:blipFill>
         <p:spPr>
           <a:xfrm>
-            <a:off x="512699" y="1370662"/>
-            <a:ext cx="5239100" cy="766913"/>
+            <a:off x="0" y="3027960"/>
+            <a:ext cx="8339400" cy="2115720"/>
           </a:xfrm>
           <a:prstGeom prst="rect">
             <a:avLst/>
@@ -12854,7 +13166,7 @@
       </p:pic>
       <p:pic>
         <p:nvPicPr>
-          <p:cNvPr id="114" name="Google Shape;114;p21" title="Fase2AW.png"/>
+          <p:cNvPr id="104" name="Google Shape;104;p20"/>
           <p:cNvPicPr preferRelativeResize="0"/>
           <p:nvPr/>
         </p:nvPicPr>
@@ -12867,64 +13179,8 @@
         </p:blipFill>
         <p:spPr>
           <a:xfrm>
-            <a:off x="512700" y="2310850"/>
-            <a:ext cx="5541000" cy="712650"/>
-          </a:xfrm>
-          <a:prstGeom prst="rect">
-            <a:avLst/>
-          </a:prstGeom>
-          <a:noFill/>
-          <a:ln>
-            <a:noFill/>
-          </a:ln>
-        </p:spPr>
-      </p:pic>
-      <p:pic>
-        <p:nvPicPr>
-          <p:cNvPr id="115" name="Google Shape;115;p21" title="Fase3.1AW.png"/>
-          <p:cNvPicPr preferRelativeResize="0"/>
-          <p:nvPr/>
-        </p:nvPicPr>
-        <p:blipFill>
-          <a:blip r:embed="rId5">
-            <a:alphaModFix/>
-          </a:blip>
-          <a:stretch>
-            <a:fillRect/>
-          </a:stretch>
-        </p:blipFill>
-        <p:spPr>
-          <a:xfrm>
-            <a:off x="512701" y="3196775"/>
-            <a:ext cx="5789126" cy="1915875"/>
-          </a:xfrm>
-          <a:prstGeom prst="rect">
-            <a:avLst/>
-          </a:prstGeom>
-          <a:noFill/>
-          <a:ln>
-            <a:noFill/>
-          </a:ln>
-        </p:spPr>
-      </p:pic>
-      <p:pic>
-        <p:nvPicPr>
-          <p:cNvPr id="116" name="Google Shape;116;p21" title="SumaMariposa.png"/>
-          <p:cNvPicPr preferRelativeResize="0"/>
-          <p:nvPr/>
-        </p:nvPicPr>
-        <p:blipFill>
-          <a:blip r:embed="rId6">
-            <a:alphaModFix/>
-          </a:blip>
-          <a:stretch>
-            <a:fillRect/>
-          </a:stretch>
-        </p:blipFill>
-        <p:spPr>
-          <a:xfrm>
-            <a:off x="1273885" y="1197375"/>
-            <a:ext cx="6596227" cy="3585226"/>
+            <a:off x="295560" y="685800"/>
+            <a:ext cx="7019639" cy="2066400"/>
           </a:xfrm>
           <a:prstGeom prst="rect">
             <a:avLst/>
@@ -12940,306 +13196,87 @@
   <p:clrMapOvr>
     <a:masterClrMapping/>
   </p:clrMapOvr>
-  <p:timing>
-    <p:tnLst>
-      <p:par>
-        <p:cTn dur="indefinite" nodeType="tmRoot" restart="never">
-          <p:childTnLst>
-            <p:seq concurrent="1" nextAc="seek">
-              <p:cTn dur="indefinite" id="2" nodeType="mainSeq">
-                <p:childTnLst>
-                  <p:par>
-                    <p:cTn fill="hold">
-                      <p:stCondLst>
-                        <p:cond delay="indefinite"/>
-                      </p:stCondLst>
-                      <p:childTnLst>
-                        <p:par>
-                          <p:cTn fill="hold">
-                            <p:stCondLst>
-                              <p:cond delay="0"/>
-                            </p:stCondLst>
-                            <p:childTnLst>
-                              <p:par>
-                                <p:cTn fill="hold" nodeType="clickEffect" presetClass="entr" presetID="1" presetSubtype="0">
-                                  <p:stCondLst>
-                                    <p:cond delay="0"/>
-                                  </p:stCondLst>
-                                  <p:childTnLst>
-                                    <p:set>
-                                      <p:cBhvr>
-                                        <p:cTn dur="1" fill="hold">
-                                          <p:stCondLst>
-                                            <p:cond delay="0"/>
-                                          </p:stCondLst>
-                                        </p:cTn>
-                                        <p:tgtEl>
-                                          <p:spTgt spid="113"/>
-                                        </p:tgtEl>
-                                        <p:attrNameLst>
-                                          <p:attrName>style.visibility</p:attrName>
-                                        </p:attrNameLst>
-                                      </p:cBhvr>
-                                      <p:to>
-                                        <p:strVal val="visible"/>
-                                      </p:to>
-                                    </p:set>
-                                  </p:childTnLst>
-                                </p:cTn>
-                              </p:par>
-                            </p:childTnLst>
-                          </p:cTn>
-                        </p:par>
-                      </p:childTnLst>
-                    </p:cTn>
-                  </p:par>
-                  <p:par>
-                    <p:cTn fill="hold">
-                      <p:stCondLst>
-                        <p:cond delay="indefinite"/>
-                      </p:stCondLst>
-                      <p:childTnLst>
-                        <p:par>
-                          <p:cTn fill="hold">
-                            <p:stCondLst>
-                              <p:cond delay="0"/>
-                            </p:stCondLst>
-                            <p:childTnLst>
-                              <p:par>
-                                <p:cTn fill="hold" nodeType="clickEffect" presetClass="entr" presetID="1" presetSubtype="0">
-                                  <p:stCondLst>
-                                    <p:cond delay="0"/>
-                                  </p:stCondLst>
-                                  <p:childTnLst>
-                                    <p:set>
-                                      <p:cBhvr>
-                                        <p:cTn dur="1" fill="hold">
-                                          <p:stCondLst>
-                                            <p:cond delay="0"/>
-                                          </p:stCondLst>
-                                        </p:cTn>
-                                        <p:tgtEl>
-                                          <p:spTgt spid="114"/>
-                                        </p:tgtEl>
-                                        <p:attrNameLst>
-                                          <p:attrName>style.visibility</p:attrName>
-                                        </p:attrNameLst>
-                                      </p:cBhvr>
-                                      <p:to>
-                                        <p:strVal val="visible"/>
-                                      </p:to>
-                                    </p:set>
-                                  </p:childTnLst>
-                                </p:cTn>
-                              </p:par>
-                            </p:childTnLst>
-                          </p:cTn>
-                        </p:par>
-                      </p:childTnLst>
-                    </p:cTn>
-                  </p:par>
-                  <p:par>
-                    <p:cTn fill="hold">
-                      <p:stCondLst>
-                        <p:cond delay="indefinite"/>
-                      </p:stCondLst>
-                      <p:childTnLst>
-                        <p:par>
-                          <p:cTn fill="hold">
-                            <p:stCondLst>
-                              <p:cond delay="0"/>
-                            </p:stCondLst>
-                            <p:childTnLst>
-                              <p:par>
-                                <p:cTn fill="hold" nodeType="clickEffect" presetClass="entr" presetID="1" presetSubtype="0">
-                                  <p:stCondLst>
-                                    <p:cond delay="0"/>
-                                  </p:stCondLst>
-                                  <p:childTnLst>
-                                    <p:set>
-                                      <p:cBhvr>
-                                        <p:cTn dur="1" fill="hold">
-                                          <p:stCondLst>
-                                            <p:cond delay="0"/>
-                                          </p:stCondLst>
-                                        </p:cTn>
-                                        <p:tgtEl>
-                                          <p:spTgt spid="115"/>
-                                        </p:tgtEl>
-                                        <p:attrNameLst>
-                                          <p:attrName>style.visibility</p:attrName>
-                                        </p:attrNameLst>
-                                      </p:cBhvr>
-                                      <p:to>
-                                        <p:strVal val="visible"/>
-                                      </p:to>
-                                    </p:set>
-                                  </p:childTnLst>
-                                </p:cTn>
-                              </p:par>
-                            </p:childTnLst>
-                          </p:cTn>
-                        </p:par>
-                      </p:childTnLst>
-                    </p:cTn>
-                  </p:par>
-                  <p:par>
-                    <p:cTn fill="hold">
-                      <p:stCondLst>
-                        <p:cond delay="indefinite"/>
-                      </p:stCondLst>
-                      <p:childTnLst>
-                        <p:par>
-                          <p:cTn fill="hold">
-                            <p:stCondLst>
-                              <p:cond delay="0"/>
-                            </p:stCondLst>
-                            <p:childTnLst>
-                              <p:par>
-                                <p:cTn fill="hold" nodeType="clickEffect" presetClass="exit" presetID="1" presetSubtype="0">
-                                  <p:stCondLst>
-                                    <p:cond delay="0"/>
-                                  </p:stCondLst>
-                                  <p:childTnLst>
-                                    <p:set>
-                                      <p:cBhvr>
-                                        <p:cTn dur="1" fill="hold">
-                                          <p:stCondLst>
-                                            <p:cond delay="0"/>
-                                          </p:stCondLst>
-                                        </p:cTn>
-                                        <p:tgtEl>
-                                          <p:spTgt spid="113"/>
-                                        </p:tgtEl>
-                                        <p:attrNameLst>
-                                          <p:attrName>style.visibility</p:attrName>
-                                        </p:attrNameLst>
-                                      </p:cBhvr>
-                                      <p:to>
-                                        <p:strVal val="hidden"/>
-                                      </p:to>
-                                    </p:set>
-                                  </p:childTnLst>
-                                </p:cTn>
-                              </p:par>
-                              <p:par>
-                                <p:cTn fill="hold" nodeType="withEffect" presetClass="exit" presetID="1" presetSubtype="0">
-                                  <p:stCondLst>
-                                    <p:cond delay="0"/>
-                                  </p:stCondLst>
-                                  <p:childTnLst>
-                                    <p:set>
-                                      <p:cBhvr>
-                                        <p:cTn dur="1" fill="hold">
-                                          <p:stCondLst>
-                                            <p:cond delay="0"/>
-                                          </p:stCondLst>
-                                        </p:cTn>
-                                        <p:tgtEl>
-                                          <p:spTgt spid="114"/>
-                                        </p:tgtEl>
-                                        <p:attrNameLst>
-                                          <p:attrName>style.visibility</p:attrName>
-                                        </p:attrNameLst>
-                                      </p:cBhvr>
-                                      <p:to>
-                                        <p:strVal val="hidden"/>
-                                      </p:to>
-                                    </p:set>
-                                  </p:childTnLst>
-                                </p:cTn>
-                              </p:par>
-                              <p:par>
-                                <p:cTn fill="hold" nodeType="withEffect" presetClass="exit" presetID="1" presetSubtype="0">
-                                  <p:stCondLst>
-                                    <p:cond delay="0"/>
-                                  </p:stCondLst>
-                                  <p:childTnLst>
-                                    <p:set>
-                                      <p:cBhvr>
-                                        <p:cTn dur="1" fill="hold">
-                                          <p:stCondLst>
-                                            <p:cond delay="0"/>
-                                          </p:stCondLst>
-                                        </p:cTn>
-                                        <p:tgtEl>
-                                          <p:spTgt spid="115"/>
-                                        </p:tgtEl>
-                                        <p:attrNameLst>
-                                          <p:attrName>style.visibility</p:attrName>
-                                        </p:attrNameLst>
-                                      </p:cBhvr>
-                                      <p:to>
-                                        <p:strVal val="hidden"/>
-                                      </p:to>
-                                    </p:set>
-                                  </p:childTnLst>
-                                </p:cTn>
-                              </p:par>
-                            </p:childTnLst>
-                          </p:cTn>
-                        </p:par>
-                        <p:par>
-                          <p:cTn fill="hold">
-                            <p:stCondLst>
-                              <p:cond delay="0"/>
-                            </p:stCondLst>
-                            <p:childTnLst>
-                              <p:par>
-                                <p:cTn fill="hold" nodeType="afterEffect" presetClass="entr" presetID="1" presetSubtype="0">
-                                  <p:stCondLst>
-                                    <p:cond delay="0"/>
-                                  </p:stCondLst>
-                                  <p:childTnLst>
-                                    <p:set>
-                                      <p:cBhvr>
-                                        <p:cTn dur="1" fill="hold">
-                                          <p:stCondLst>
-                                            <p:cond delay="0"/>
-                                          </p:stCondLst>
-                                        </p:cTn>
-                                        <p:tgtEl>
-                                          <p:spTgt spid="116"/>
-                                        </p:tgtEl>
-                                        <p:attrNameLst>
-                                          <p:attrName>style.visibility</p:attrName>
-                                        </p:attrNameLst>
-                                      </p:cBhvr>
-                                      <p:to>
-                                        <p:strVal val="visible"/>
-                                      </p:to>
-                                    </p:set>
-                                  </p:childTnLst>
-                                </p:cTn>
-                              </p:par>
-                            </p:childTnLst>
-                          </p:cTn>
-                        </p:par>
-                      </p:childTnLst>
-                    </p:cTn>
-                  </p:par>
-                </p:childTnLst>
-              </p:cTn>
-              <p:prevCondLst>
-                <p:cond evt="onPrev">
-                  <p:tgtEl>
-                    <p:sldTgt/>
-                  </p:tgtEl>
-                </p:cond>
-              </p:prevCondLst>
-              <p:nextCondLst>
-                <p:cond evt="onNext">
-                  <p:tgtEl>
-                    <p:sldTgt/>
-                  </p:tgtEl>
-                </p:cond>
-              </p:nextCondLst>
-            </p:seq>
-          </p:childTnLst>
-        </p:cTn>
-      </p:par>
-    </p:tnLst>
-  </p:timing>
+</p:sld>
+</file>
+
+<file path=ppt/slides/slide9.xml><?xml version="1.0" encoding="utf-8"?>
+<p:sld xmlns:a="http://schemas.openxmlformats.org/drawingml/2006/main" xmlns:r="http://schemas.openxmlformats.org/officeDocument/2006/relationships" xmlns:mc="http://schemas.openxmlformats.org/markup-compatibility/2006" xmlns:mv="urn:schemas-microsoft-com:mac:vml" xmlns:p="http://schemas.openxmlformats.org/presentationml/2006/main" xmlns:c="http://schemas.openxmlformats.org/drawingml/2006/chart" xmlns:dgm="http://schemas.openxmlformats.org/drawingml/2006/diagram" xmlns:o="urn:schemas-microsoft-com:office:office" xmlns:v="urn:schemas-microsoft-com:vml" xmlns:pvml="urn:schemas-microsoft-com:office:powerpoint" xmlns:com="http://schemas.openxmlformats.org/drawingml/2006/compatibility" xmlns:p14="http://schemas.microsoft.com/office/powerpoint/2010/main" xmlns:p15="http://schemas.microsoft.com/office/powerpoint/2012/main" xmlns:ahyp="http://schemas.microsoft.com/office/drawing/2018/hyperlinkcolor">
+  <p:cSld>
+    <p:spTree>
+      <p:nvGrpSpPr>
+        <p:cNvPr id="108" name="Shape 108"/>
+        <p:cNvGrpSpPr/>
+        <p:nvPr/>
+      </p:nvGrpSpPr>
+      <p:grpSpPr>
+        <a:xfrm>
+          <a:off x="0" y="0"/>
+          <a:ext cx="0" cy="0"/>
+          <a:chOff x="0" y="0"/>
+          <a:chExt cx="0" cy="0"/>
+        </a:xfrm>
+      </p:grpSpPr>
+      <p:pic>
+        <p:nvPicPr>
+          <p:cNvPr id="109" name="Google Shape;109;p21" title="Screenshot 2025-06-17 230405.png"/>
+          <p:cNvPicPr preferRelativeResize="0"/>
+          <p:nvPr/>
+        </p:nvPicPr>
+        <p:blipFill>
+          <a:blip r:embed="rId3">
+            <a:alphaModFix/>
+          </a:blip>
+          <a:stretch>
+            <a:fillRect/>
+          </a:stretch>
+        </p:blipFill>
+        <p:spPr>
+          <a:xfrm>
+            <a:off x="0" y="2906615"/>
+            <a:ext cx="9143997" cy="1866309"/>
+          </a:xfrm>
+          <a:prstGeom prst="rect">
+            <a:avLst/>
+          </a:prstGeom>
+          <a:noFill/>
+          <a:ln>
+            <a:noFill/>
+          </a:ln>
+        </p:spPr>
+      </p:pic>
+      <p:pic>
+        <p:nvPicPr>
+          <p:cNvPr id="110" name="Google Shape;110;p21" title="Screenshot 2025-06-17 230337.png"/>
+          <p:cNvPicPr preferRelativeResize="0"/>
+          <p:nvPr/>
+        </p:nvPicPr>
+        <p:blipFill>
+          <a:blip r:embed="rId4">
+            <a:alphaModFix/>
+          </a:blip>
+          <a:stretch>
+            <a:fillRect/>
+          </a:stretch>
+        </p:blipFill>
+        <p:spPr>
+          <a:xfrm>
+            <a:off x="0" y="383988"/>
+            <a:ext cx="9144003" cy="2187774"/>
+          </a:xfrm>
+          <a:prstGeom prst="rect">
+            <a:avLst/>
+          </a:prstGeom>
+          <a:noFill/>
+          <a:ln>
+            <a:noFill/>
+          </a:ln>
+        </p:spPr>
+      </p:pic>
+    </p:spTree>
+  </p:cSld>
+  <p:clrMapOvr>
+    <a:masterClrMapping/>
+  </p:clrMapOvr>
 </p:sld>
 </file>
 

</xml_diff>